<commit_message>
modified:   IT_Projektas.pptx 	new file:   ~$IT_Projektas.pptx
</commit_message>
<xml_diff>
--- a/IT_Projektas.pptx
+++ b/IT_Projektas.pptx
@@ -5,7 +5,7 @@
     <p:sldMasterId id="2147483673" r:id="rId1"/>
   </p:sldMasterIdLst>
   <p:notesMasterIdLst>
-    <p:notesMasterId r:id="rId17"/>
+    <p:notesMasterId r:id="rId18"/>
   </p:notesMasterIdLst>
   <p:sldIdLst>
     <p:sldId id="256" r:id="rId2"/>
@@ -22,48 +22,49 @@
     <p:sldId id="296" r:id="rId13"/>
     <p:sldId id="297" r:id="rId14"/>
     <p:sldId id="298" r:id="rId15"/>
-    <p:sldId id="269" r:id="rId16"/>
+    <p:sldId id="299" r:id="rId16"/>
+    <p:sldId id="269" r:id="rId17"/>
   </p:sldIdLst>
   <p:sldSz cx="9144000" cy="5143500" type="screen16x9"/>
   <p:notesSz cx="6858000" cy="9144000"/>
   <p:embeddedFontLst>
     <p:embeddedFont>
       <p:font typeface="IBM Plex Mono" panose="020B0509050203000203" pitchFamily="49" charset="77"/>
-      <p:regular r:id="rId18"/>
-      <p:bold r:id="rId19"/>
-      <p:italic r:id="rId20"/>
-      <p:boldItalic r:id="rId21"/>
+      <p:regular r:id="rId19"/>
+      <p:bold r:id="rId20"/>
+      <p:italic r:id="rId21"/>
+      <p:boldItalic r:id="rId22"/>
     </p:embeddedFont>
     <p:embeddedFont>
       <p:font typeface="IBM Plex Mono SemiBold" panose="020B0709050203000203" pitchFamily="49" charset="77"/>
-      <p:regular r:id="rId22"/>
-      <p:bold r:id="rId23"/>
-      <p:italic r:id="rId24"/>
-      <p:boldItalic r:id="rId25"/>
+      <p:regular r:id="rId23"/>
+      <p:bold r:id="rId24"/>
+      <p:italic r:id="rId25"/>
+      <p:boldItalic r:id="rId26"/>
     </p:embeddedFont>
     <p:embeddedFont>
       <p:font typeface="Lato" panose="020F0502020204030203" pitchFamily="34" charset="0"/>
-      <p:regular r:id="rId26"/>
-      <p:bold r:id="rId27"/>
-      <p:italic r:id="rId28"/>
-      <p:boldItalic r:id="rId29"/>
+      <p:regular r:id="rId27"/>
+      <p:bold r:id="rId28"/>
+      <p:italic r:id="rId29"/>
+      <p:boldItalic r:id="rId30"/>
     </p:embeddedFont>
     <p:embeddedFont>
       <p:font typeface="Roboto" panose="02000000000000000000" pitchFamily="2" charset="0"/>
-      <p:regular r:id="rId30"/>
-      <p:bold r:id="rId31"/>
-      <p:italic r:id="rId32"/>
-      <p:boldItalic r:id="rId33"/>
+      <p:regular r:id="rId31"/>
+      <p:bold r:id="rId32"/>
+      <p:italic r:id="rId33"/>
+      <p:boldItalic r:id="rId34"/>
     </p:embeddedFont>
     <p:embeddedFont>
       <p:font typeface="Space Grotesk" pitchFamily="2" charset="77"/>
-      <p:regular r:id="rId34"/>
-      <p:bold r:id="rId35"/>
+      <p:regular r:id="rId35"/>
+      <p:bold r:id="rId36"/>
     </p:embeddedFont>
     <p:embeddedFont>
       <p:font typeface="Space Grotesk Light" pitchFamily="2" charset="77"/>
-      <p:regular r:id="rId36"/>
-      <p:bold r:id="rId37"/>
+      <p:regular r:id="rId37"/>
+      <p:bold r:id="rId38"/>
     </p:embeddedFont>
   </p:embeddedFontLst>
   <p:defaultTextStyle>
@@ -295,6 +296,11 @@
       </a:defRPr>
     </a:lvl9pPr>
   </p:defaultTextStyle>
+  <p:extLst>
+    <p:ext uri="{EFAFB233-063F-42B5-8137-9DF3F51BA10A}">
+      <p15:sldGuideLst xmlns:p15="http://schemas.microsoft.com/office/powerpoint/2012/main"/>
+    </p:ext>
+  </p:extLst>
 </p:presentation>
 </file>
 
@@ -14282,7 +14288,7 @@
             </a:r>
             <a:r>
               <a:rPr lang="en" sz="4000" dirty="0" err="1"/>
-              <a:t>technikines</a:t>
+              <a:t>techninės</a:t>
             </a:r>
             <a:r>
               <a:rPr lang="en" sz="4000" dirty="0"/>
@@ -14646,8 +14652,8 @@
         </p:blipFill>
         <p:spPr>
           <a:xfrm>
-            <a:off x="4299860" y="733690"/>
-            <a:ext cx="4615240" cy="2825140"/>
+            <a:off x="5072100" y="733690"/>
+            <a:ext cx="3843000" cy="2352427"/>
           </a:xfrm>
           <a:prstGeom prst="rect">
             <a:avLst/>
@@ -14659,13 +14665,13 @@
   <p:clrMapOvr>
     <a:masterClrMapping/>
   </p:clrMapOvr>
-  <mc:AlternateContent xmlns:mc="http://schemas.openxmlformats.org/markup-compatibility/2006">
-    <mc:Choice xmlns:p14="http://schemas.microsoft.com/office/powerpoint/2010/main" Requires="p14">
+  <mc:AlternateContent xmlns:mc="http://schemas.openxmlformats.org/markup-compatibility/2006" xmlns:p14="http://schemas.microsoft.com/office/powerpoint/2010/main">
+    <mc:Choice Requires="p14">
       <p:transition spd="slow" p14:dur="3900">
         <p14:glitter pattern="hexagon"/>
       </p:transition>
     </mc:Choice>
-    <mc:Fallback>
+    <mc:Fallback xmlns="">
       <p:transition spd="slow">
         <p:fade/>
       </p:transition>
@@ -15371,13 +15377,13 @@
   <p:clrMapOvr>
     <a:masterClrMapping/>
   </p:clrMapOvr>
-  <mc:AlternateContent xmlns:mc="http://schemas.openxmlformats.org/markup-compatibility/2006">
-    <mc:Choice xmlns:p159="http://schemas.microsoft.com/office/powerpoint/2015/09/main" Requires="p159">
+  <mc:AlternateContent xmlns:mc="http://schemas.openxmlformats.org/markup-compatibility/2006" xmlns:p159="http://schemas.microsoft.com/office/powerpoint/2015/09/main">
+    <mc:Choice Requires="p159">
       <p:transition xmlns:p14="http://schemas.microsoft.com/office/powerpoint/2010/main" spd="slow" p14:dur="2000">
         <p159:morph option="byObject"/>
       </p:transition>
     </mc:Choice>
-    <mc:Fallback>
+    <mc:Fallback xmlns="">
       <p:transition spd="slow">
         <p:fade/>
       </p:transition>
@@ -16307,13 +16313,13 @@
   <p:clrMapOvr>
     <a:masterClrMapping/>
   </p:clrMapOvr>
-  <mc:AlternateContent xmlns:mc="http://schemas.openxmlformats.org/markup-compatibility/2006">
-    <mc:Choice xmlns:p159="http://schemas.microsoft.com/office/powerpoint/2015/09/main" Requires="p159">
+  <mc:AlternateContent xmlns:mc="http://schemas.openxmlformats.org/markup-compatibility/2006" xmlns:p159="http://schemas.microsoft.com/office/powerpoint/2015/09/main">
+    <mc:Choice Requires="p159">
       <p:transition xmlns:p14="http://schemas.microsoft.com/office/powerpoint/2010/main" spd="slow" p14:dur="2000">
         <p159:morph option="byObject"/>
       </p:transition>
     </mc:Choice>
-    <mc:Fallback>
+    <mc:Fallback xmlns="">
       <p:transition spd="slow">
         <p:fade/>
       </p:transition>
@@ -16418,7 +16424,11 @@
             </a:r>
             <a:r>
               <a:rPr lang="lt-LT" dirty="0"/>
-              <a:t> panelė</a:t>
+              <a:t> </a:t>
+            </a:r>
+            <a:r>
+              <a:rPr lang="lt-LT" dirty="0" err="1"/>
+              <a:t>panel</a:t>
             </a:r>
             <a:endParaRPr lang="en-GB" dirty="0"/>
           </a:p>
@@ -16879,7 +16889,11 @@
             </a:r>
             <a:r>
               <a:rPr lang="lt-LT" dirty="0"/>
-              <a:t> panelė</a:t>
+              <a:t> </a:t>
+            </a:r>
+            <a:r>
+              <a:rPr lang="lt-LT" dirty="0" err="1"/>
+              <a:t>panel</a:t>
             </a:r>
             <a:endParaRPr lang="en-GB" dirty="0"/>
           </a:p>
@@ -17276,13 +17290,13 @@
   <p:clrMapOvr>
     <a:masterClrMapping/>
   </p:clrMapOvr>
-  <mc:AlternateContent xmlns:mc="http://schemas.openxmlformats.org/markup-compatibility/2006">
-    <mc:Choice xmlns:p159="http://schemas.microsoft.com/office/powerpoint/2015/09/main" Requires="p159">
+  <mc:AlternateContent xmlns:mc="http://schemas.openxmlformats.org/markup-compatibility/2006" xmlns:p159="http://schemas.microsoft.com/office/powerpoint/2015/09/main">
+    <mc:Choice Requires="p159">
       <p:transition xmlns:p14="http://schemas.microsoft.com/office/powerpoint/2010/main" spd="slow" p14:dur="2000">
         <p159:morph option="byObject"/>
       </p:transition>
     </mc:Choice>
-    <mc:Fallback>
+    <mc:Fallback xmlns="">
       <p:transition spd="slow">
         <p:fade/>
       </p:transition>
@@ -17292,6 +17306,219 @@
 </file>
 
 <file path=ppt/slides/slide15.xml><?xml version="1.0" encoding="utf-8"?>
+<p:sld xmlns:a="http://schemas.openxmlformats.org/drawingml/2006/main" xmlns:r="http://schemas.openxmlformats.org/officeDocument/2006/relationships" xmlns:p="http://schemas.openxmlformats.org/presentationml/2006/main">
+  <p:cSld>
+    <p:spTree>
+      <p:nvGrpSpPr>
+        <p:cNvPr id="1" name=""/>
+        <p:cNvGrpSpPr/>
+        <p:nvPr/>
+      </p:nvGrpSpPr>
+      <p:grpSpPr>
+        <a:xfrm>
+          <a:off x="0" y="0"/>
+          <a:ext cx="0" cy="0"/>
+          <a:chOff x="0" y="0"/>
+          <a:chExt cx="0" cy="0"/>
+        </a:xfrm>
+      </p:grpSpPr>
+      <p:pic>
+        <p:nvPicPr>
+          <p:cNvPr id="5" name="Picture 4" descr="A screen shot of a black background&#10;&#10;AI-generated content may be incorrect.">
+            <a:extLst>
+              <a:ext uri="{FF2B5EF4-FFF2-40B4-BE49-F238E27FC236}">
+                <a16:creationId xmlns:a16="http://schemas.microsoft.com/office/drawing/2014/main" id="{5A738E5A-3FEA-11BD-0007-BC2FEB7FBD5B}"/>
+              </a:ext>
+            </a:extLst>
+          </p:cNvPr>
+          <p:cNvPicPr>
+            <a:picLocks noChangeAspect="1"/>
+          </p:cNvPicPr>
+          <p:nvPr/>
+        </p:nvPicPr>
+        <p:blipFill>
+          <a:blip r:embed="rId2">
+            <a:extLst>
+              <a:ext uri="{BEBA8EAE-BF5A-486C-A8C5-ECC9F3942E4B}">
+                <a14:imgProps xmlns:a14="http://schemas.microsoft.com/office/drawing/2010/main">
+                  <a14:imgLayer r:embed="rId3">
+                    <a14:imgEffect>
+                      <a14:backgroundRemoval t="3863" b="97511" l="3059" r="96824">
+                        <a14:foregroundMark x1="9176" y1="9270" x2="9176" y2="24635"/>
+                        <a14:foregroundMark x1="4588" y1="2575" x2="39529" y2="12361"/>
+                        <a14:foregroundMark x1="39529" y1="12361" x2="50000" y2="18455"/>
+                        <a14:foregroundMark x1="50000" y1="18455" x2="42471" y2="45923"/>
+                        <a14:foregroundMark x1="42471" y1="45923" x2="50941" y2="53133"/>
+                        <a14:foregroundMark x1="50941" y1="53133" x2="40588" y2="58627"/>
+                        <a14:foregroundMark x1="40588" y1="58627" x2="18353" y2="61116"/>
+                        <a14:foregroundMark x1="18353" y1="61116" x2="9765" y2="53991"/>
+                        <a14:foregroundMark x1="9765" y1="53991" x2="7647" y2="4034"/>
+                        <a14:foregroundMark x1="11765" y1="3004" x2="42118" y2="6695"/>
+                        <a14:foregroundMark x1="42118" y1="6695" x2="70235" y2="3004"/>
+                        <a14:foregroundMark x1="70235" y1="3004" x2="83882" y2="3262"/>
+                        <a14:foregroundMark x1="83882" y1="3262" x2="95647" y2="8069"/>
+                        <a14:foregroundMark x1="95647" y1="8069" x2="96235" y2="86266"/>
+                        <a14:foregroundMark x1="96235" y1="86266" x2="92588" y2="96567"/>
+                        <a14:foregroundMark x1="92588" y1="96567" x2="63647" y2="99399"/>
+                        <a14:foregroundMark x1="63647" y1="99399" x2="14706" y2="96738"/>
+                        <a14:foregroundMark x1="14706" y1="96738" x2="7059" y2="87039"/>
+                        <a14:foregroundMark x1="7059" y1="87039" x2="3294" y2="45236"/>
+                        <a14:foregroundMark x1="3294" y1="45236" x2="3647" y2="44635"/>
+                        <a14:foregroundMark x1="6588" y1="90386" x2="20118" y2="97940"/>
+                        <a14:foregroundMark x1="20118" y1="97940" x2="33412" y2="97940"/>
+                        <a14:foregroundMark x1="33412" y1="97940" x2="93412" y2="95708"/>
+                        <a14:foregroundMark x1="93412" y1="95708" x2="93059" y2="4292"/>
+                        <a14:foregroundMark x1="84706" y1="4979" x2="60118" y2="6781"/>
+                        <a14:foregroundMark x1="60118" y1="6781" x2="47529" y2="12189"/>
+                        <a14:foregroundMark x1="47529" y1="12189" x2="56588" y2="21373"/>
+                        <a14:foregroundMark x1="56588" y1="21373" x2="78824" y2="22747"/>
+                        <a14:foregroundMark x1="78824" y1="22747" x2="80235" y2="33648"/>
+                        <a14:foregroundMark x1="80235" y1="33648" x2="64353" y2="46524"/>
+                        <a14:foregroundMark x1="64353" y1="46524" x2="53059" y2="51416"/>
+                        <a14:foregroundMark x1="53059" y1="51416" x2="62941" y2="61888"/>
+                        <a14:foregroundMark x1="62941" y1="61888" x2="65529" y2="41803"/>
+                        <a14:foregroundMark x1="65529" y1="41803" x2="47765" y2="94678"/>
+                        <a14:foregroundMark x1="47765" y1="94678" x2="78353" y2="85751"/>
+                        <a14:foregroundMark x1="78353" y1="85751" x2="86941" y2="64378"/>
+                        <a14:foregroundMark x1="86941" y1="64378" x2="86824" y2="52790"/>
+                        <a14:foregroundMark x1="86824" y1="52790" x2="88118" y2="62918"/>
+                        <a14:foregroundMark x1="88118" y1="62918" x2="73529" y2="54764"/>
+                        <a14:foregroundMark x1="73529" y1="54764" x2="71176" y2="35708"/>
+                        <a14:foregroundMark x1="71176" y1="35708" x2="82353" y2="43004"/>
+                        <a14:foregroundMark x1="82353" y1="43004" x2="91529" y2="9356"/>
+                        <a14:foregroundMark x1="91529" y1="9356" x2="70353" y2="16137"/>
+                        <a14:foregroundMark x1="70353" y1="16137" x2="68824" y2="20515"/>
+                        <a14:foregroundMark x1="66706" y1="14249" x2="50235" y2="15451"/>
+                        <a14:foregroundMark x1="50235" y1="15451" x2="63647" y2="14077"/>
+                        <a14:foregroundMark x1="63647" y1="14077" x2="45529" y2="12704"/>
+                        <a14:foregroundMark x1="45529" y1="12704" x2="48706" y2="13906"/>
+                        <a14:foregroundMark x1="68471" y1="77768" x2="40235" y2="74850"/>
+                        <a14:foregroundMark x1="40235" y1="74850" x2="71176" y2="72532"/>
+                        <a14:foregroundMark x1="71176" y1="72532" x2="59765" y2="76996"/>
+                        <a14:foregroundMark x1="59765" y1="76996" x2="55529" y2="82232"/>
+                        <a14:foregroundMark x1="96941" y1="6867" x2="95882" y2="31845"/>
+                        <a14:foregroundMark x1="54471" y1="97253" x2="65882" y2="97511"/>
+                        <a14:backgroundMark x1="2353" y1="1631" x2="588" y2="343"/>
+                        <a14:backgroundMark x1="2941" y1="858" x2="0" y2="3948"/>
+                        <a14:backgroundMark x1="3882" y1="1974" x2="2588" y2="1717"/>
+                        <a14:backgroundMark x1="824" y1="22146" x2="706" y2="3176"/>
+                        <a14:backgroundMark x1="706" y1="31245" x2="706" y2="31245"/>
+                        <a14:backgroundMark x1="471" y1="38112" x2="235" y2="22060"/>
+                        <a14:backgroundMark x1="235" y1="56052" x2="1412" y2="36910"/>
+                        <a14:backgroundMark x1="706" y1="54335" x2="1059" y2="93305"/>
+                        <a14:backgroundMark x1="588" y1="93648" x2="2706" y2="99056"/>
+                        <a14:backgroundMark x1="99176" y1="97854" x2="88471" y2="99657"/>
+                        <a14:backgroundMark x1="90353" y1="99657" x2="78000" y2="99914"/>
+                      </a14:backgroundRemoval>
+                    </a14:imgEffect>
+                  </a14:imgLayer>
+                </a14:imgProps>
+              </a:ext>
+            </a:extLst>
+          </a:blip>
+          <a:stretch>
+            <a:fillRect/>
+          </a:stretch>
+        </p:blipFill>
+        <p:spPr>
+          <a:xfrm>
+            <a:off x="4893239" y="238167"/>
+            <a:ext cx="3408153" cy="4667165"/>
+          </a:xfrm>
+          <a:prstGeom prst="rect">
+            <a:avLst/>
+          </a:prstGeom>
+        </p:spPr>
+      </p:pic>
+      <p:sp>
+        <p:nvSpPr>
+          <p:cNvPr id="6" name="TextBox 5">
+            <a:extLst>
+              <a:ext uri="{FF2B5EF4-FFF2-40B4-BE49-F238E27FC236}">
+                <a16:creationId xmlns:a16="http://schemas.microsoft.com/office/drawing/2014/main" id="{C55BD97F-029B-6E4B-B52E-92BDF8FF952E}"/>
+              </a:ext>
+            </a:extLst>
+          </p:cNvPr>
+          <p:cNvSpPr txBox="1"/>
+          <p:nvPr/>
+        </p:nvSpPr>
+        <p:spPr>
+          <a:xfrm>
+            <a:off x="301698" y="470264"/>
+            <a:ext cx="4270302" cy="1477328"/>
+          </a:xfrm>
+          <a:prstGeom prst="rect">
+            <a:avLst/>
+          </a:prstGeom>
+          <a:noFill/>
+        </p:spPr>
+        <p:txBody>
+          <a:bodyPr wrap="square" rtlCol="0">
+            <a:spAutoFit/>
+          </a:bodyPr>
+          <a:lstStyle/>
+          <a:p>
+            <a:r>
+              <a:rPr lang="en-LT" sz="4500" b="1" dirty="0">
+                <a:solidFill>
+                  <a:schemeClr val="tx1"/>
+                </a:solidFill>
+              </a:rPr>
+              <a:t>Darbų Pasiskirstimas</a:t>
+            </a:r>
+          </a:p>
+        </p:txBody>
+      </p:sp>
+      <p:pic>
+        <p:nvPicPr>
+          <p:cNvPr id="8" name="Picture 7">
+            <a:extLst>
+              <a:ext uri="{FF2B5EF4-FFF2-40B4-BE49-F238E27FC236}">
+                <a16:creationId xmlns:a16="http://schemas.microsoft.com/office/drawing/2014/main" id="{2748892A-6D72-416C-3694-7AC0CD66D9C7}"/>
+              </a:ext>
+            </a:extLst>
+          </p:cNvPr>
+          <p:cNvPicPr>
+            <a:picLocks noChangeAspect="1"/>
+          </p:cNvPicPr>
+          <p:nvPr/>
+        </p:nvPicPr>
+        <p:blipFill>
+          <a:blip r:embed="rId4">
+            <a:extLst>
+              <a:ext uri="{837473B0-CC2E-450A-ABE3-18F120FF3D39}">
+                <a1611:picAttrSrcUrl xmlns:a1611="http://schemas.microsoft.com/office/drawing/2016/11/main" r:id="rId5"/>
+              </a:ext>
+            </a:extLst>
+          </a:blip>
+          <a:stretch>
+            <a:fillRect/>
+          </a:stretch>
+        </p:blipFill>
+        <p:spPr>
+          <a:xfrm>
+            <a:off x="453118" y="2058623"/>
+            <a:ext cx="4118882" cy="2745921"/>
+          </a:xfrm>
+          <a:prstGeom prst="rect">
+            <a:avLst/>
+          </a:prstGeom>
+        </p:spPr>
+      </p:pic>
+    </p:spTree>
+    <p:extLst>
+      <p:ext uri="{BB962C8B-B14F-4D97-AF65-F5344CB8AC3E}">
+        <p14:creationId xmlns:p14="http://schemas.microsoft.com/office/powerpoint/2010/main" val="3283989524"/>
+      </p:ext>
+    </p:extLst>
+  </p:cSld>
+  <p:clrMapOvr>
+    <a:masterClrMapping/>
+  </p:clrMapOvr>
+</p:sld>
+</file>
+
+<file path=ppt/slides/slide16.xml><?xml version="1.0" encoding="utf-8"?>
 <p:sld xmlns:a="http://schemas.openxmlformats.org/drawingml/2006/main" xmlns:r="http://schemas.openxmlformats.org/officeDocument/2006/relationships" xmlns:p="http://schemas.openxmlformats.org/presentationml/2006/main">
   <p:cSld>
     <p:spTree>
@@ -17749,13 +17976,13 @@
   <p:clrMapOvr>
     <a:masterClrMapping/>
   </p:clrMapOvr>
-  <mc:AlternateContent xmlns:mc="http://schemas.openxmlformats.org/markup-compatibility/2006">
-    <mc:Choice xmlns:p14="http://schemas.microsoft.com/office/powerpoint/2010/main" Requires="p14">
+  <mc:AlternateContent xmlns:mc="http://schemas.openxmlformats.org/markup-compatibility/2006" xmlns:p14="http://schemas.microsoft.com/office/powerpoint/2010/main">
+    <mc:Choice Requires="p14">
       <p:transition spd="slow" p14:dur="3900">
         <p14:glitter pattern="hexagon"/>
       </p:transition>
     </mc:Choice>
-    <mc:Fallback>
+    <mc:Fallback xmlns="">
       <p:transition spd="slow">
         <p:fade/>
       </p:transition>
@@ -17885,7 +18112,7 @@
           <a:p>
             <a:r>
               <a:rPr lang="lt-LT" dirty="0"/>
-              <a:t>Automobilių užregistravimas</a:t>
+              <a:t>Auto registravimas</a:t>
             </a:r>
             <a:endParaRPr lang="en-GB" dirty="0"/>
           </a:p>
@@ -18497,15 +18724,15 @@
           <a:p>
             <a:r>
               <a:rPr lang="en-GB" dirty="0" err="1"/>
-              <a:t>išveda</a:t>
+              <a:t>Duomenų</a:t>
             </a:r>
             <a:r>
               <a:rPr lang="en-GB" dirty="0"/>
-              <a:t> visas </a:t>
+              <a:t> </a:t>
             </a:r>
             <a:r>
               <a:rPr lang="en-GB" dirty="0" err="1"/>
-              <a:t>mašinas</a:t>
+              <a:t>bazė</a:t>
             </a:r>
             <a:r>
               <a:rPr lang="en-GB" dirty="0"/>
@@ -18564,12 +18791,8 @@
           <a:lstStyle/>
           <a:p>
             <a:r>
-              <a:rPr lang="lt-LT" dirty="0" err="1"/>
-              <a:t>Duoemnų</a:t>
-            </a:r>
-            <a:r>
               <a:rPr lang="lt-LT" dirty="0"/>
-              <a:t> bazė su filtrų opcijomis</a:t>
+              <a:t>Duomenų bazė su filtravimu</a:t>
             </a:r>
           </a:p>
         </p:txBody>
@@ -18601,7 +18824,15 @@
           <a:p>
             <a:r>
               <a:rPr lang="en-GB" dirty="0"/>
-              <a:t>Tech ap. </a:t>
+              <a:t>Tech </a:t>
+            </a:r>
+            <a:r>
+              <a:rPr lang="en-GB" dirty="0" err="1"/>
+              <a:t>apžiūros</a:t>
+            </a:r>
+            <a:r>
+              <a:rPr lang="en-GB" dirty="0"/>
+              <a:t>. </a:t>
             </a:r>
             <a:r>
               <a:rPr lang="en-GB" dirty="0" err="1"/>
@@ -18626,8 +18857,8 @@
         </p:nvSpPr>
         <p:spPr>
           <a:xfrm>
-            <a:off x="1447801" y="2834814"/>
-            <a:ext cx="3939064" cy="310800"/>
+            <a:off x="228600" y="2834814"/>
+            <a:ext cx="5158265" cy="310800"/>
           </a:xfrm>
           <a:prstGeom prst="rect">
             <a:avLst/>
@@ -18640,12 +18871,24 @@
           <a:lstStyle/>
           <a:p>
             <a:r>
+              <a:rPr lang="en-GB" dirty="0" err="1"/>
+              <a:t>Administratoriaus</a:t>
+            </a:r>
+            <a:r>
               <a:rPr lang="en-GB" dirty="0"/>
-              <a:t>Admin panel </a:t>
+              <a:t> </a:t>
             </a:r>
             <a:r>
               <a:rPr lang="en-GB" dirty="0" err="1"/>
-              <a:t>kur</a:t>
+              <a:t>langas</a:t>
+            </a:r>
+            <a:r>
+              <a:rPr lang="en-GB" dirty="0"/>
+              <a:t> </a:t>
+            </a:r>
+            <a:r>
+              <a:rPr lang="en-GB" dirty="0" err="1"/>
+              <a:t>kuriame</a:t>
             </a:r>
             <a:r>
               <a:rPr lang="en-GB" dirty="0"/>
@@ -18688,13 +18931,13 @@
   <p:clrMapOvr>
     <a:masterClrMapping/>
   </p:clrMapOvr>
-  <mc:AlternateContent xmlns:mc="http://schemas.openxmlformats.org/markup-compatibility/2006">
-    <mc:Choice xmlns:p14="http://schemas.microsoft.com/office/powerpoint/2010/main" Requires="p14">
+  <mc:AlternateContent xmlns:mc="http://schemas.openxmlformats.org/markup-compatibility/2006" xmlns:p14="http://schemas.microsoft.com/office/powerpoint/2010/main">
+    <mc:Choice Requires="p14">
       <p:transition spd="slow" p14:dur="3900">
         <p14:glitter pattern="hexagon"/>
       </p:transition>
     </mc:Choice>
-    <mc:Fallback>
+    <mc:Fallback xmlns="">
       <p:transition spd="slow">
         <p:fade/>
       </p:transition>
@@ -19101,13 +19344,13 @@
   <p:clrMapOvr>
     <a:masterClrMapping/>
   </p:clrMapOvr>
-  <mc:AlternateContent xmlns:mc="http://schemas.openxmlformats.org/markup-compatibility/2006">
-    <mc:Choice xmlns:p159="http://schemas.microsoft.com/office/powerpoint/2015/09/main" Requires="p159">
+  <mc:AlternateContent xmlns:mc="http://schemas.openxmlformats.org/markup-compatibility/2006" xmlns:p159="http://schemas.microsoft.com/office/powerpoint/2015/09/main">
+    <mc:Choice Requires="p159">
       <p:transition xmlns:p14="http://schemas.microsoft.com/office/powerpoint/2010/main" spd="slow" p14:dur="2000">
         <p159:morph option="byObject"/>
       </p:transition>
     </mc:Choice>
-    <mc:Fallback>
+    <mc:Fallback xmlns="">
       <p:transition spd="slow">
         <p:fade/>
       </p:transition>
@@ -19514,13 +19757,13 @@
   <p:clrMapOvr>
     <a:masterClrMapping/>
   </p:clrMapOvr>
-  <mc:AlternateContent xmlns:mc="http://schemas.openxmlformats.org/markup-compatibility/2006">
-    <mc:Choice xmlns:p159="http://schemas.microsoft.com/office/powerpoint/2015/09/main" Requires="p159">
+  <mc:AlternateContent xmlns:mc="http://schemas.openxmlformats.org/markup-compatibility/2006" xmlns:p159="http://schemas.microsoft.com/office/powerpoint/2015/09/main">
+    <mc:Choice Requires="p159">
       <p:transition xmlns:p14="http://schemas.microsoft.com/office/powerpoint/2010/main" spd="slow" p14:dur="2000">
         <p159:morph option="byObject"/>
       </p:transition>
     </mc:Choice>
-    <mc:Fallback>
+    <mc:Fallback xmlns="">
       <p:transition spd="slow">
         <p:fade/>
       </p:transition>
@@ -19618,7 +19861,7 @@
           <a:p>
             <a:r>
               <a:rPr lang="lt-LT" dirty="0"/>
-              <a:t>Automobilių užregistravimas</a:t>
+              <a:t>Auto registravimas</a:t>
             </a:r>
             <a:endParaRPr lang="en-GB" dirty="0"/>
           </a:p>
@@ -20055,7 +20298,7 @@
           <a:p>
             <a:r>
               <a:rPr lang="lt-LT" dirty="0"/>
-              <a:t>Automobilių užregistravimas</a:t>
+              <a:t>Auto registravimas</a:t>
             </a:r>
             <a:endParaRPr lang="en-GB" dirty="0"/>
           </a:p>
@@ -20441,13 +20684,13 @@
   <p:clrMapOvr>
     <a:masterClrMapping/>
   </p:clrMapOvr>
-  <mc:AlternateContent xmlns:mc="http://schemas.openxmlformats.org/markup-compatibility/2006">
-    <mc:Choice xmlns:p159="http://schemas.microsoft.com/office/powerpoint/2015/09/main" Requires="p159">
+  <mc:AlternateContent xmlns:mc="http://schemas.openxmlformats.org/markup-compatibility/2006" xmlns:p159="http://schemas.microsoft.com/office/powerpoint/2015/09/main">
+    <mc:Choice Requires="p159">
       <p:transition xmlns:p14="http://schemas.microsoft.com/office/powerpoint/2010/main" spd="slow" p14:dur="2000">
         <p159:morph option="byObject"/>
       </p:transition>
     </mc:Choice>
-    <mc:Fallback>
+    <mc:Fallback xmlns="">
       <p:transition spd="slow">
         <p:fade/>
       </p:transition>
@@ -21348,13 +21591,13 @@
   <p:clrMapOvr>
     <a:masterClrMapping/>
   </p:clrMapOvr>
-  <mc:AlternateContent xmlns:mc="http://schemas.openxmlformats.org/markup-compatibility/2006">
-    <mc:Choice xmlns:p159="http://schemas.microsoft.com/office/powerpoint/2015/09/main" Requires="p159">
+  <mc:AlternateContent xmlns:mc="http://schemas.openxmlformats.org/markup-compatibility/2006" xmlns:p159="http://schemas.microsoft.com/office/powerpoint/2015/09/main">
+    <mc:Choice Requires="p159">
       <p:transition xmlns:p14="http://schemas.microsoft.com/office/powerpoint/2010/main" spd="slow" p14:dur="2000">
         <p159:morph option="byObject"/>
       </p:transition>
     </mc:Choice>
-    <mc:Fallback>
+    <mc:Fallback xmlns="">
       <p:transition spd="slow">
         <p:fade/>
       </p:transition>

</xml_diff>